<commit_message>
Update to 2024 easter
</commit_message>
<xml_diff>
--- a/korsord.pptx
+++ b/korsord.pptx
@@ -104,6 +104,22 @@
       </a:defRPr>
     </a:lvl9pPr>
   </p:defaultTextStyle>
+  <p:extLst>
+    <p:ext uri="{EFAFB233-063F-42B5-8137-9DF3F51BA10A}">
+      <p15:sldGuideLst xmlns:p15="http://schemas.microsoft.com/office/powerpoint/2012/main">
+        <p15:guide id="1" orient="horz" pos="2160">
+          <p15:clr>
+            <a:srgbClr val="A4A3A4"/>
+          </p15:clr>
+        </p15:guide>
+        <p15:guide id="2" pos="2880">
+          <p15:clr>
+            <a:srgbClr val="A4A3A4"/>
+          </p15:clr>
+        </p15:guide>
+      </p15:sldGuideLst>
+    </p:ext>
+  </p:extLst>
 </p:presentation>
 </file>
 
@@ -145,10 +161,9 @@
           <a:lstStyle/>
           <a:p>
             <a:r>
-              <a:rPr lang="sv-SE" smtClean="0"/>
+              <a:rPr lang="sv-SE"/>
               <a:t>Klicka här för att ändra format</a:t>
             </a:r>
-            <a:endParaRPr lang="sv-SE"/>
           </a:p>
         </p:txBody>
       </p:sp>
@@ -264,10 +279,9 @@
           </a:lstStyle>
           <a:p>
             <a:r>
-              <a:rPr lang="sv-SE" smtClean="0"/>
+              <a:rPr lang="sv-SE"/>
               <a:t>Klicka här för att ändra format på underrubrik i bakgrunden</a:t>
             </a:r>
-            <a:endParaRPr lang="sv-SE"/>
           </a:p>
         </p:txBody>
       </p:sp>
@@ -288,7 +302,7 @@
           <a:p>
             <a:fld id="{994F57DB-13C5-4AE2-8074-E4A7201F9E24}" type="datetimeFigureOut">
               <a:rPr lang="sv-SE" smtClean="0"/>
-              <a:t>2019-04-16</a:t>
+              <a:t>2024-03-31</a:t>
             </a:fld>
             <a:endParaRPr lang="sv-SE"/>
           </a:p>
@@ -382,10 +396,9 @@
           <a:lstStyle/>
           <a:p>
             <a:r>
-              <a:rPr lang="sv-SE" smtClean="0"/>
+              <a:rPr lang="sv-SE"/>
               <a:t>Klicka här för att ändra format</a:t>
             </a:r>
-            <a:endParaRPr lang="sv-SE"/>
           </a:p>
         </p:txBody>
       </p:sp>
@@ -406,38 +419,37 @@
           <a:p>
             <a:pPr lvl="0"/>
             <a:r>
-              <a:rPr lang="sv-SE" smtClean="0"/>
+              <a:rPr lang="sv-SE"/>
               <a:t>Klicka här för att ändra format på bakgrundstexten</a:t>
             </a:r>
           </a:p>
           <a:p>
             <a:pPr lvl="1"/>
             <a:r>
-              <a:rPr lang="sv-SE" smtClean="0"/>
+              <a:rPr lang="sv-SE"/>
               <a:t>Nivå två</a:t>
             </a:r>
           </a:p>
           <a:p>
             <a:pPr lvl="2"/>
             <a:r>
-              <a:rPr lang="sv-SE" smtClean="0"/>
+              <a:rPr lang="sv-SE"/>
               <a:t>Nivå tre</a:t>
             </a:r>
           </a:p>
           <a:p>
             <a:pPr lvl="3"/>
             <a:r>
-              <a:rPr lang="sv-SE" smtClean="0"/>
+              <a:rPr lang="sv-SE"/>
               <a:t>Nivå fyra</a:t>
             </a:r>
           </a:p>
           <a:p>
             <a:pPr lvl="4"/>
             <a:r>
-              <a:rPr lang="sv-SE" smtClean="0"/>
+              <a:rPr lang="sv-SE"/>
               <a:t>Nivå fem</a:t>
             </a:r>
-            <a:endParaRPr lang="sv-SE"/>
           </a:p>
         </p:txBody>
       </p:sp>
@@ -458,7 +470,7 @@
           <a:p>
             <a:fld id="{994F57DB-13C5-4AE2-8074-E4A7201F9E24}" type="datetimeFigureOut">
               <a:rPr lang="sv-SE" smtClean="0"/>
-              <a:t>2019-04-16</a:t>
+              <a:t>2024-03-31</a:t>
             </a:fld>
             <a:endParaRPr lang="sv-SE"/>
           </a:p>
@@ -557,10 +569,9 @@
           <a:lstStyle/>
           <a:p>
             <a:r>
-              <a:rPr lang="sv-SE" smtClean="0"/>
+              <a:rPr lang="sv-SE"/>
               <a:t>Klicka här för att ändra format</a:t>
             </a:r>
-            <a:endParaRPr lang="sv-SE"/>
           </a:p>
         </p:txBody>
       </p:sp>
@@ -586,38 +597,37 @@
           <a:p>
             <a:pPr lvl="0"/>
             <a:r>
-              <a:rPr lang="sv-SE" smtClean="0"/>
+              <a:rPr lang="sv-SE"/>
               <a:t>Klicka här för att ändra format på bakgrundstexten</a:t>
             </a:r>
           </a:p>
           <a:p>
             <a:pPr lvl="1"/>
             <a:r>
-              <a:rPr lang="sv-SE" smtClean="0"/>
+              <a:rPr lang="sv-SE"/>
               <a:t>Nivå två</a:t>
             </a:r>
           </a:p>
           <a:p>
             <a:pPr lvl="2"/>
             <a:r>
-              <a:rPr lang="sv-SE" smtClean="0"/>
+              <a:rPr lang="sv-SE"/>
               <a:t>Nivå tre</a:t>
             </a:r>
           </a:p>
           <a:p>
             <a:pPr lvl="3"/>
             <a:r>
-              <a:rPr lang="sv-SE" smtClean="0"/>
+              <a:rPr lang="sv-SE"/>
               <a:t>Nivå fyra</a:t>
             </a:r>
           </a:p>
           <a:p>
             <a:pPr lvl="4"/>
             <a:r>
-              <a:rPr lang="sv-SE" smtClean="0"/>
+              <a:rPr lang="sv-SE"/>
               <a:t>Nivå fem</a:t>
             </a:r>
-            <a:endParaRPr lang="sv-SE"/>
           </a:p>
         </p:txBody>
       </p:sp>
@@ -638,7 +648,7 @@
           <a:p>
             <a:fld id="{994F57DB-13C5-4AE2-8074-E4A7201F9E24}" type="datetimeFigureOut">
               <a:rPr lang="sv-SE" smtClean="0"/>
-              <a:t>2019-04-16</a:t>
+              <a:t>2024-03-31</a:t>
             </a:fld>
             <a:endParaRPr lang="sv-SE"/>
           </a:p>
@@ -732,10 +742,9 @@
           <a:lstStyle/>
           <a:p>
             <a:r>
-              <a:rPr lang="sv-SE" smtClean="0"/>
+              <a:rPr lang="sv-SE"/>
               <a:t>Klicka här för att ändra format</a:t>
             </a:r>
-            <a:endParaRPr lang="sv-SE"/>
           </a:p>
         </p:txBody>
       </p:sp>
@@ -756,38 +765,37 @@
           <a:p>
             <a:pPr lvl="0"/>
             <a:r>
-              <a:rPr lang="sv-SE" smtClean="0"/>
+              <a:rPr lang="sv-SE"/>
               <a:t>Klicka här för att ändra format på bakgrundstexten</a:t>
             </a:r>
           </a:p>
           <a:p>
             <a:pPr lvl="1"/>
             <a:r>
-              <a:rPr lang="sv-SE" smtClean="0"/>
+              <a:rPr lang="sv-SE"/>
               <a:t>Nivå två</a:t>
             </a:r>
           </a:p>
           <a:p>
             <a:pPr lvl="2"/>
             <a:r>
-              <a:rPr lang="sv-SE" smtClean="0"/>
+              <a:rPr lang="sv-SE"/>
               <a:t>Nivå tre</a:t>
             </a:r>
           </a:p>
           <a:p>
             <a:pPr lvl="3"/>
             <a:r>
-              <a:rPr lang="sv-SE" smtClean="0"/>
+              <a:rPr lang="sv-SE"/>
               <a:t>Nivå fyra</a:t>
             </a:r>
           </a:p>
           <a:p>
             <a:pPr lvl="4"/>
             <a:r>
-              <a:rPr lang="sv-SE" smtClean="0"/>
+              <a:rPr lang="sv-SE"/>
               <a:t>Nivå fem</a:t>
             </a:r>
-            <a:endParaRPr lang="sv-SE"/>
           </a:p>
         </p:txBody>
       </p:sp>
@@ -808,7 +816,7 @@
           <a:p>
             <a:fld id="{994F57DB-13C5-4AE2-8074-E4A7201F9E24}" type="datetimeFigureOut">
               <a:rPr lang="sv-SE" smtClean="0"/>
-              <a:t>2019-04-16</a:t>
+              <a:t>2024-03-31</a:t>
             </a:fld>
             <a:endParaRPr lang="sv-SE"/>
           </a:p>
@@ -911,10 +919,9 @@
           </a:lstStyle>
           <a:p>
             <a:r>
-              <a:rPr lang="sv-SE" smtClean="0"/>
+              <a:rPr lang="sv-SE"/>
               <a:t>Klicka här för att ändra format</a:t>
             </a:r>
-            <a:endParaRPr lang="sv-SE"/>
           </a:p>
         </p:txBody>
       </p:sp>
@@ -1031,7 +1038,7 @@
           <a:p>
             <a:pPr lvl="0"/>
             <a:r>
-              <a:rPr lang="sv-SE" smtClean="0"/>
+              <a:rPr lang="sv-SE"/>
               <a:t>Klicka här för att ändra format på bakgrundstexten</a:t>
             </a:r>
           </a:p>
@@ -1054,7 +1061,7 @@
           <a:p>
             <a:fld id="{994F57DB-13C5-4AE2-8074-E4A7201F9E24}" type="datetimeFigureOut">
               <a:rPr lang="sv-SE" smtClean="0"/>
-              <a:t>2019-04-16</a:t>
+              <a:t>2024-03-31</a:t>
             </a:fld>
             <a:endParaRPr lang="sv-SE"/>
           </a:p>
@@ -1148,10 +1155,9 @@
           <a:lstStyle/>
           <a:p>
             <a:r>
-              <a:rPr lang="sv-SE" smtClean="0"/>
+              <a:rPr lang="sv-SE"/>
               <a:t>Klicka här för att ändra format</a:t>
             </a:r>
-            <a:endParaRPr lang="sv-SE"/>
           </a:p>
         </p:txBody>
       </p:sp>
@@ -1205,38 +1211,37 @@
           <a:p>
             <a:pPr lvl="0"/>
             <a:r>
-              <a:rPr lang="sv-SE" smtClean="0"/>
+              <a:rPr lang="sv-SE"/>
               <a:t>Klicka här för att ändra format på bakgrundstexten</a:t>
             </a:r>
           </a:p>
           <a:p>
             <a:pPr lvl="1"/>
             <a:r>
-              <a:rPr lang="sv-SE" smtClean="0"/>
+              <a:rPr lang="sv-SE"/>
               <a:t>Nivå två</a:t>
             </a:r>
           </a:p>
           <a:p>
             <a:pPr lvl="2"/>
             <a:r>
-              <a:rPr lang="sv-SE" smtClean="0"/>
+              <a:rPr lang="sv-SE"/>
               <a:t>Nivå tre</a:t>
             </a:r>
           </a:p>
           <a:p>
             <a:pPr lvl="3"/>
             <a:r>
-              <a:rPr lang="sv-SE" smtClean="0"/>
+              <a:rPr lang="sv-SE"/>
               <a:t>Nivå fyra</a:t>
             </a:r>
           </a:p>
           <a:p>
             <a:pPr lvl="4"/>
             <a:r>
-              <a:rPr lang="sv-SE" smtClean="0"/>
+              <a:rPr lang="sv-SE"/>
               <a:t>Nivå fem</a:t>
             </a:r>
-            <a:endParaRPr lang="sv-SE"/>
           </a:p>
         </p:txBody>
       </p:sp>
@@ -1290,38 +1295,37 @@
           <a:p>
             <a:pPr lvl="0"/>
             <a:r>
-              <a:rPr lang="sv-SE" smtClean="0"/>
+              <a:rPr lang="sv-SE"/>
               <a:t>Klicka här för att ändra format på bakgrundstexten</a:t>
             </a:r>
           </a:p>
           <a:p>
             <a:pPr lvl="1"/>
             <a:r>
-              <a:rPr lang="sv-SE" smtClean="0"/>
+              <a:rPr lang="sv-SE"/>
               <a:t>Nivå två</a:t>
             </a:r>
           </a:p>
           <a:p>
             <a:pPr lvl="2"/>
             <a:r>
-              <a:rPr lang="sv-SE" smtClean="0"/>
+              <a:rPr lang="sv-SE"/>
               <a:t>Nivå tre</a:t>
             </a:r>
           </a:p>
           <a:p>
             <a:pPr lvl="3"/>
             <a:r>
-              <a:rPr lang="sv-SE" smtClean="0"/>
+              <a:rPr lang="sv-SE"/>
               <a:t>Nivå fyra</a:t>
             </a:r>
           </a:p>
           <a:p>
             <a:pPr lvl="4"/>
             <a:r>
-              <a:rPr lang="sv-SE" smtClean="0"/>
+              <a:rPr lang="sv-SE"/>
               <a:t>Nivå fem</a:t>
             </a:r>
-            <a:endParaRPr lang="sv-SE"/>
           </a:p>
         </p:txBody>
       </p:sp>
@@ -1342,7 +1346,7 @@
           <a:p>
             <a:fld id="{994F57DB-13C5-4AE2-8074-E4A7201F9E24}" type="datetimeFigureOut">
               <a:rPr lang="sv-SE" smtClean="0"/>
-              <a:t>2019-04-16</a:t>
+              <a:t>2024-03-31</a:t>
             </a:fld>
             <a:endParaRPr lang="sv-SE"/>
           </a:p>
@@ -1440,10 +1444,9 @@
           </a:lstStyle>
           <a:p>
             <a:r>
-              <a:rPr lang="sv-SE" smtClean="0"/>
+              <a:rPr lang="sv-SE"/>
               <a:t>Klicka här för att ändra format</a:t>
             </a:r>
-            <a:endParaRPr lang="sv-SE"/>
           </a:p>
         </p:txBody>
       </p:sp>
@@ -1506,7 +1509,7 @@
           <a:p>
             <a:pPr lvl="0"/>
             <a:r>
-              <a:rPr lang="sv-SE" smtClean="0"/>
+              <a:rPr lang="sv-SE"/>
               <a:t>Klicka här för att ändra format på bakgrundstexten</a:t>
             </a:r>
           </a:p>
@@ -1562,38 +1565,37 @@
           <a:p>
             <a:pPr lvl="0"/>
             <a:r>
-              <a:rPr lang="sv-SE" smtClean="0"/>
+              <a:rPr lang="sv-SE"/>
               <a:t>Klicka här för att ändra format på bakgrundstexten</a:t>
             </a:r>
           </a:p>
           <a:p>
             <a:pPr lvl="1"/>
             <a:r>
-              <a:rPr lang="sv-SE" smtClean="0"/>
+              <a:rPr lang="sv-SE"/>
               <a:t>Nivå två</a:t>
             </a:r>
           </a:p>
           <a:p>
             <a:pPr lvl="2"/>
             <a:r>
-              <a:rPr lang="sv-SE" smtClean="0"/>
+              <a:rPr lang="sv-SE"/>
               <a:t>Nivå tre</a:t>
             </a:r>
           </a:p>
           <a:p>
             <a:pPr lvl="3"/>
             <a:r>
-              <a:rPr lang="sv-SE" smtClean="0"/>
+              <a:rPr lang="sv-SE"/>
               <a:t>Nivå fyra</a:t>
             </a:r>
           </a:p>
           <a:p>
             <a:pPr lvl="4"/>
             <a:r>
-              <a:rPr lang="sv-SE" smtClean="0"/>
+              <a:rPr lang="sv-SE"/>
               <a:t>Nivå fem</a:t>
             </a:r>
-            <a:endParaRPr lang="sv-SE"/>
           </a:p>
         </p:txBody>
       </p:sp>
@@ -1656,7 +1658,7 @@
           <a:p>
             <a:pPr lvl="0"/>
             <a:r>
-              <a:rPr lang="sv-SE" smtClean="0"/>
+              <a:rPr lang="sv-SE"/>
               <a:t>Klicka här för att ändra format på bakgrundstexten</a:t>
             </a:r>
           </a:p>
@@ -1712,38 +1714,37 @@
           <a:p>
             <a:pPr lvl="0"/>
             <a:r>
-              <a:rPr lang="sv-SE" smtClean="0"/>
+              <a:rPr lang="sv-SE"/>
               <a:t>Klicka här för att ändra format på bakgrundstexten</a:t>
             </a:r>
           </a:p>
           <a:p>
             <a:pPr lvl="1"/>
             <a:r>
-              <a:rPr lang="sv-SE" smtClean="0"/>
+              <a:rPr lang="sv-SE"/>
               <a:t>Nivå två</a:t>
             </a:r>
           </a:p>
           <a:p>
             <a:pPr lvl="2"/>
             <a:r>
-              <a:rPr lang="sv-SE" smtClean="0"/>
+              <a:rPr lang="sv-SE"/>
               <a:t>Nivå tre</a:t>
             </a:r>
           </a:p>
           <a:p>
             <a:pPr lvl="3"/>
             <a:r>
-              <a:rPr lang="sv-SE" smtClean="0"/>
+              <a:rPr lang="sv-SE"/>
               <a:t>Nivå fyra</a:t>
             </a:r>
           </a:p>
           <a:p>
             <a:pPr lvl="4"/>
             <a:r>
-              <a:rPr lang="sv-SE" smtClean="0"/>
+              <a:rPr lang="sv-SE"/>
               <a:t>Nivå fem</a:t>
             </a:r>
-            <a:endParaRPr lang="sv-SE"/>
           </a:p>
         </p:txBody>
       </p:sp>
@@ -1764,7 +1765,7 @@
           <a:p>
             <a:fld id="{994F57DB-13C5-4AE2-8074-E4A7201F9E24}" type="datetimeFigureOut">
               <a:rPr lang="sv-SE" smtClean="0"/>
-              <a:t>2019-04-16</a:t>
+              <a:t>2024-03-31</a:t>
             </a:fld>
             <a:endParaRPr lang="sv-SE"/>
           </a:p>
@@ -1858,10 +1859,9 @@
           <a:lstStyle/>
           <a:p>
             <a:r>
-              <a:rPr lang="sv-SE" smtClean="0"/>
+              <a:rPr lang="sv-SE"/>
               <a:t>Klicka här för att ändra format</a:t>
             </a:r>
-            <a:endParaRPr lang="sv-SE"/>
           </a:p>
         </p:txBody>
       </p:sp>
@@ -1882,7 +1882,7 @@
           <a:p>
             <a:fld id="{994F57DB-13C5-4AE2-8074-E4A7201F9E24}" type="datetimeFigureOut">
               <a:rPr lang="sv-SE" smtClean="0"/>
-              <a:t>2019-04-16</a:t>
+              <a:t>2024-03-31</a:t>
             </a:fld>
             <a:endParaRPr lang="sv-SE"/>
           </a:p>
@@ -1977,7 +1977,7 @@
           <a:p>
             <a:fld id="{994F57DB-13C5-4AE2-8074-E4A7201F9E24}" type="datetimeFigureOut">
               <a:rPr lang="sv-SE" smtClean="0"/>
-              <a:t>2019-04-16</a:t>
+              <a:t>2024-03-31</a:t>
             </a:fld>
             <a:endParaRPr lang="sv-SE"/>
           </a:p>
@@ -2080,10 +2080,9 @@
           </a:lstStyle>
           <a:p>
             <a:r>
-              <a:rPr lang="sv-SE" smtClean="0"/>
+              <a:rPr lang="sv-SE"/>
               <a:t>Klicka här för att ändra format</a:t>
             </a:r>
-            <a:endParaRPr lang="sv-SE"/>
           </a:p>
         </p:txBody>
       </p:sp>
@@ -2137,38 +2136,37 @@
           <a:p>
             <a:pPr lvl="0"/>
             <a:r>
-              <a:rPr lang="sv-SE" smtClean="0"/>
+              <a:rPr lang="sv-SE"/>
               <a:t>Klicka här för att ändra format på bakgrundstexten</a:t>
             </a:r>
           </a:p>
           <a:p>
             <a:pPr lvl="1"/>
             <a:r>
-              <a:rPr lang="sv-SE" smtClean="0"/>
+              <a:rPr lang="sv-SE"/>
               <a:t>Nivå två</a:t>
             </a:r>
           </a:p>
           <a:p>
             <a:pPr lvl="2"/>
             <a:r>
-              <a:rPr lang="sv-SE" smtClean="0"/>
+              <a:rPr lang="sv-SE"/>
               <a:t>Nivå tre</a:t>
             </a:r>
           </a:p>
           <a:p>
             <a:pPr lvl="3"/>
             <a:r>
-              <a:rPr lang="sv-SE" smtClean="0"/>
+              <a:rPr lang="sv-SE"/>
               <a:t>Nivå fyra</a:t>
             </a:r>
           </a:p>
           <a:p>
             <a:pPr lvl="4"/>
             <a:r>
-              <a:rPr lang="sv-SE" smtClean="0"/>
+              <a:rPr lang="sv-SE"/>
               <a:t>Nivå fem</a:t>
             </a:r>
-            <a:endParaRPr lang="sv-SE"/>
           </a:p>
         </p:txBody>
       </p:sp>
@@ -2231,7 +2229,7 @@
           <a:p>
             <a:pPr lvl="0"/>
             <a:r>
-              <a:rPr lang="sv-SE" smtClean="0"/>
+              <a:rPr lang="sv-SE"/>
               <a:t>Klicka här för att ändra format på bakgrundstexten</a:t>
             </a:r>
           </a:p>
@@ -2254,7 +2252,7 @@
           <a:p>
             <a:fld id="{994F57DB-13C5-4AE2-8074-E4A7201F9E24}" type="datetimeFigureOut">
               <a:rPr lang="sv-SE" smtClean="0"/>
-              <a:t>2019-04-16</a:t>
+              <a:t>2024-03-31</a:t>
             </a:fld>
             <a:endParaRPr lang="sv-SE"/>
           </a:p>
@@ -2357,10 +2355,9 @@
           </a:lstStyle>
           <a:p>
             <a:r>
-              <a:rPr lang="sv-SE" smtClean="0"/>
+              <a:rPr lang="sv-SE"/>
               <a:t>Klicka här för att ändra format</a:t>
             </a:r>
-            <a:endParaRPr lang="sv-SE"/>
           </a:p>
         </p:txBody>
       </p:sp>
@@ -2484,7 +2481,7 @@
           <a:p>
             <a:pPr lvl="0"/>
             <a:r>
-              <a:rPr lang="sv-SE" smtClean="0"/>
+              <a:rPr lang="sv-SE"/>
               <a:t>Klicka här för att ändra format på bakgrundstexten</a:t>
             </a:r>
           </a:p>
@@ -2507,7 +2504,7 @@
           <a:p>
             <a:fld id="{994F57DB-13C5-4AE2-8074-E4A7201F9E24}" type="datetimeFigureOut">
               <a:rPr lang="sv-SE" smtClean="0"/>
-              <a:t>2019-04-16</a:t>
+              <a:t>2024-03-31</a:t>
             </a:fld>
             <a:endParaRPr lang="sv-SE"/>
           </a:p>
@@ -2616,10 +2613,9 @@
           <a:lstStyle/>
           <a:p>
             <a:r>
-              <a:rPr lang="sv-SE" smtClean="0"/>
+              <a:rPr lang="sv-SE"/>
               <a:t>Klicka här för att ändra format</a:t>
             </a:r>
-            <a:endParaRPr lang="sv-SE"/>
           </a:p>
         </p:txBody>
       </p:sp>
@@ -2650,38 +2646,37 @@
           <a:p>
             <a:pPr lvl="0"/>
             <a:r>
-              <a:rPr lang="sv-SE" smtClean="0"/>
+              <a:rPr lang="sv-SE"/>
               <a:t>Klicka här för att ändra format på bakgrundstexten</a:t>
             </a:r>
           </a:p>
           <a:p>
             <a:pPr lvl="1"/>
             <a:r>
-              <a:rPr lang="sv-SE" smtClean="0"/>
+              <a:rPr lang="sv-SE"/>
               <a:t>Nivå två</a:t>
             </a:r>
           </a:p>
           <a:p>
             <a:pPr lvl="2"/>
             <a:r>
-              <a:rPr lang="sv-SE" smtClean="0"/>
+              <a:rPr lang="sv-SE"/>
               <a:t>Nivå tre</a:t>
             </a:r>
           </a:p>
           <a:p>
             <a:pPr lvl="3"/>
             <a:r>
-              <a:rPr lang="sv-SE" smtClean="0"/>
+              <a:rPr lang="sv-SE"/>
               <a:t>Nivå fyra</a:t>
             </a:r>
           </a:p>
           <a:p>
             <a:pPr lvl="4"/>
             <a:r>
-              <a:rPr lang="sv-SE" smtClean="0"/>
+              <a:rPr lang="sv-SE"/>
               <a:t>Nivå fem</a:t>
             </a:r>
-            <a:endParaRPr lang="sv-SE"/>
           </a:p>
         </p:txBody>
       </p:sp>
@@ -2720,7 +2715,7 @@
           <a:p>
             <a:fld id="{994F57DB-13C5-4AE2-8074-E4A7201F9E24}" type="datetimeFigureOut">
               <a:rPr lang="sv-SE" smtClean="0"/>
-              <a:t>2019-04-16</a:t>
+              <a:t>2024-03-31</a:t>
             </a:fld>
             <a:endParaRPr lang="sv-SE"/>
           </a:p>
@@ -3838,10 +3833,9 @@
           <a:lstStyle/>
           <a:p>
             <a:r>
-              <a:rPr lang="sv-SE" b="1" dirty="0" smtClean="0"/>
+              <a:rPr lang="sv-SE" b="1" dirty="0"/>
               <a:t>1</a:t>
             </a:r>
-            <a:endParaRPr lang="sv-SE" b="1" dirty="0"/>
           </a:p>
         </p:txBody>
       </p:sp>
@@ -3868,10 +3862,9 @@
           <a:lstStyle/>
           <a:p>
             <a:r>
-              <a:rPr lang="sv-SE" b="1" dirty="0" smtClean="0"/>
+              <a:rPr lang="sv-SE" b="1" dirty="0"/>
               <a:t>2</a:t>
             </a:r>
-            <a:endParaRPr lang="sv-SE" b="1" dirty="0"/>
           </a:p>
         </p:txBody>
       </p:sp>
@@ -3898,10 +3891,9 @@
           <a:lstStyle/>
           <a:p>
             <a:r>
-              <a:rPr lang="sv-SE" b="1" dirty="0" smtClean="0"/>
+              <a:rPr lang="sv-SE" b="1" dirty="0"/>
               <a:t>3</a:t>
             </a:r>
-            <a:endParaRPr lang="sv-SE" b="1" dirty="0"/>
           </a:p>
         </p:txBody>
       </p:sp>
@@ -3931,7 +3923,6 @@
               <a:rPr lang="sv-SE" b="1" dirty="0"/>
               <a:t>4</a:t>
             </a:r>
-            <a:endParaRPr lang="sv-SE" b="1" dirty="0"/>
           </a:p>
         </p:txBody>
       </p:sp>
@@ -4198,10 +4189,9 @@
           <a:lstStyle/>
           <a:p>
             <a:r>
-              <a:rPr lang="sv-SE" sz="1400" dirty="0" smtClean="0"/>
+              <a:rPr lang="sv-SE" sz="1400" dirty="0"/>
               <a:t>1</a:t>
             </a:r>
-            <a:endParaRPr lang="sv-SE" sz="1400" dirty="0"/>
           </a:p>
         </p:txBody>
       </p:sp>
@@ -4231,7 +4221,6 @@
               <a:rPr lang="sv-SE" sz="1400" dirty="0"/>
               <a:t>3</a:t>
             </a:r>
-            <a:endParaRPr lang="sv-SE" sz="1400" dirty="0"/>
           </a:p>
         </p:txBody>
       </p:sp>
@@ -4261,7 +4250,6 @@
               <a:rPr lang="sv-SE" sz="1400" dirty="0"/>
               <a:t>5</a:t>
             </a:r>
-            <a:endParaRPr lang="sv-SE" sz="1400" dirty="0"/>
           </a:p>
         </p:txBody>
       </p:sp>
@@ -4291,7 +4279,6 @@
               <a:rPr lang="sv-SE" sz="1400" dirty="0"/>
               <a:t>4</a:t>
             </a:r>
-            <a:endParaRPr lang="sv-SE" sz="1400" dirty="0"/>
           </a:p>
         </p:txBody>
       </p:sp>
@@ -4321,7 +4308,6 @@
               <a:rPr lang="sv-SE" sz="1400" dirty="0"/>
               <a:t>2</a:t>
             </a:r>
-            <a:endParaRPr lang="sv-SE" sz="1400" dirty="0"/>
           </a:p>
         </p:txBody>
       </p:sp>
@@ -4348,10 +4334,9 @@
           <a:lstStyle/>
           <a:p>
             <a:r>
-              <a:rPr lang="sv-SE" sz="1400" dirty="0" smtClean="0"/>
+              <a:rPr lang="sv-SE" sz="1400" dirty="0"/>
               <a:t>1</a:t>
             </a:r>
-            <a:endParaRPr lang="sv-SE" sz="1400" dirty="0"/>
           </a:p>
         </p:txBody>
       </p:sp>
@@ -4381,7 +4366,6 @@
               <a:rPr lang="sv-SE" sz="1400" dirty="0"/>
               <a:t>2</a:t>
             </a:r>
-            <a:endParaRPr lang="sv-SE" sz="1400" dirty="0"/>
           </a:p>
         </p:txBody>
       </p:sp>
@@ -4408,10 +4392,9 @@
           <a:lstStyle/>
           <a:p>
             <a:r>
-              <a:rPr lang="sv-SE" sz="1400" dirty="0" smtClean="0"/>
+              <a:rPr lang="sv-SE" sz="1400" dirty="0"/>
               <a:t>4</a:t>
             </a:r>
-            <a:endParaRPr lang="sv-SE" sz="1400" dirty="0"/>
           </a:p>
         </p:txBody>
       </p:sp>
@@ -4467,10 +4450,9 @@
           <a:lstStyle/>
           <a:p>
             <a:r>
-              <a:rPr lang="sv-SE" sz="1400" dirty="0" smtClean="0"/>
+              <a:rPr lang="sv-SE" sz="1400" dirty="0"/>
               <a:t>5</a:t>
             </a:r>
-            <a:endParaRPr lang="sv-SE" sz="1400" dirty="0"/>
           </a:p>
         </p:txBody>
       </p:sp>
@@ -4500,7 +4482,7 @@
               <a:buAutoNum type="arabicPeriod"/>
             </a:pPr>
             <a:r>
-              <a:rPr lang="sv-SE" dirty="0" smtClean="0"/>
+              <a:rPr lang="sv-SE" dirty="0"/>
               <a:t>Häftmassa</a:t>
             </a:r>
           </a:p>
@@ -4509,7 +4491,7 @@
               <a:buAutoNum type="arabicPeriod"/>
             </a:pPr>
             <a:r>
-              <a:rPr lang="sv-SE" dirty="0" smtClean="0"/>
+              <a:rPr lang="sv-SE" dirty="0"/>
               <a:t>Signes andra namn</a:t>
             </a:r>
           </a:p>
@@ -4518,8 +4500,8 @@
               <a:buAutoNum type="arabicPeriod"/>
             </a:pPr>
             <a:r>
-              <a:rPr lang="sv-SE" dirty="0" smtClean="0"/>
-              <a:t>Staden vi är i</a:t>
+              <a:rPr lang="sv-SE" dirty="0"/>
+              <a:t>Björkarnas stad</a:t>
             </a:r>
           </a:p>
           <a:p>
@@ -4527,10 +4509,9 @@
               <a:buAutoNum type="arabicPeriod"/>
             </a:pPr>
             <a:r>
-              <a:rPr lang="sv-SE" dirty="0" smtClean="0"/>
+              <a:rPr lang="sv-SE" dirty="0"/>
               <a:t>Kan spruta eld</a:t>
             </a:r>
-            <a:endParaRPr lang="sv-SE" dirty="0"/>
           </a:p>
         </p:txBody>
       </p:sp>

</xml_diff>